<commit_message>
added people drop down
</commit_message>
<xml_diff>
--- a/vlaisavljevich/images/research/gallery/GalleryFigures.pptx
+++ b/vlaisavljevich/images/research/gallery/GalleryFigures.pptx
@@ -114,7 +114,7 @@
             <a:srgbClr val="A4A3A4"/>
           </p15:clr>
         </p15:guide>
-        <p15:guide id="2" pos="6984" userDrawn="1">
+        <p15:guide id="2" pos="2064" userDrawn="1">
           <p15:clr>
             <a:srgbClr val="A4A3A4"/>
           </p15:clr>
@@ -272,7 +272,7 @@
           <a:p>
             <a:fld id="{BBD4DFF7-324E-F644-A6D8-3EAC27DBE432}" type="datetimeFigureOut">
               <a:rPr lang="en-US" smtClean="0"/>
-              <a:t>11/12/21</a:t>
+              <a:t>11/15/21</a:t>
             </a:fld>
             <a:endParaRPr lang="en-US"/>
           </a:p>
@@ -470,7 +470,7 @@
           <a:p>
             <a:fld id="{BBD4DFF7-324E-F644-A6D8-3EAC27DBE432}" type="datetimeFigureOut">
               <a:rPr lang="en-US" smtClean="0"/>
-              <a:t>11/12/21</a:t>
+              <a:t>11/15/21</a:t>
             </a:fld>
             <a:endParaRPr lang="en-US"/>
           </a:p>
@@ -678,7 +678,7 @@
           <a:p>
             <a:fld id="{BBD4DFF7-324E-F644-A6D8-3EAC27DBE432}" type="datetimeFigureOut">
               <a:rPr lang="en-US" smtClean="0"/>
-              <a:t>11/12/21</a:t>
+              <a:t>11/15/21</a:t>
             </a:fld>
             <a:endParaRPr lang="en-US"/>
           </a:p>
@@ -876,7 +876,7 @@
           <a:p>
             <a:fld id="{BBD4DFF7-324E-F644-A6D8-3EAC27DBE432}" type="datetimeFigureOut">
               <a:rPr lang="en-US" smtClean="0"/>
-              <a:t>11/12/21</a:t>
+              <a:t>11/15/21</a:t>
             </a:fld>
             <a:endParaRPr lang="en-US"/>
           </a:p>
@@ -1151,7 +1151,7 @@
           <a:p>
             <a:fld id="{BBD4DFF7-324E-F644-A6D8-3EAC27DBE432}" type="datetimeFigureOut">
               <a:rPr lang="en-US" smtClean="0"/>
-              <a:t>11/12/21</a:t>
+              <a:t>11/15/21</a:t>
             </a:fld>
             <a:endParaRPr lang="en-US"/>
           </a:p>
@@ -1416,7 +1416,7 @@
           <a:p>
             <a:fld id="{BBD4DFF7-324E-F644-A6D8-3EAC27DBE432}" type="datetimeFigureOut">
               <a:rPr lang="en-US" smtClean="0"/>
-              <a:t>11/12/21</a:t>
+              <a:t>11/15/21</a:t>
             </a:fld>
             <a:endParaRPr lang="en-US"/>
           </a:p>
@@ -1828,7 +1828,7 @@
           <a:p>
             <a:fld id="{BBD4DFF7-324E-F644-A6D8-3EAC27DBE432}" type="datetimeFigureOut">
               <a:rPr lang="en-US" smtClean="0"/>
-              <a:t>11/12/21</a:t>
+              <a:t>11/15/21</a:t>
             </a:fld>
             <a:endParaRPr lang="en-US"/>
           </a:p>
@@ -1969,7 +1969,7 @@
           <a:p>
             <a:fld id="{BBD4DFF7-324E-F644-A6D8-3EAC27DBE432}" type="datetimeFigureOut">
               <a:rPr lang="en-US" smtClean="0"/>
-              <a:t>11/12/21</a:t>
+              <a:t>11/15/21</a:t>
             </a:fld>
             <a:endParaRPr lang="en-US"/>
           </a:p>
@@ -2082,7 +2082,7 @@
           <a:p>
             <a:fld id="{BBD4DFF7-324E-F644-A6D8-3EAC27DBE432}" type="datetimeFigureOut">
               <a:rPr lang="en-US" smtClean="0"/>
-              <a:t>11/12/21</a:t>
+              <a:t>11/15/21</a:t>
             </a:fld>
             <a:endParaRPr lang="en-US"/>
           </a:p>
@@ -2393,7 +2393,7 @@
           <a:p>
             <a:fld id="{BBD4DFF7-324E-F644-A6D8-3EAC27DBE432}" type="datetimeFigureOut">
               <a:rPr lang="en-US" smtClean="0"/>
-              <a:t>11/12/21</a:t>
+              <a:t>11/15/21</a:t>
             </a:fld>
             <a:endParaRPr lang="en-US"/>
           </a:p>
@@ -2681,7 +2681,7 @@
           <a:p>
             <a:fld id="{BBD4DFF7-324E-F644-A6D8-3EAC27DBE432}" type="datetimeFigureOut">
               <a:rPr lang="en-US" smtClean="0"/>
-              <a:t>11/12/21</a:t>
+              <a:t>11/15/21</a:t>
             </a:fld>
             <a:endParaRPr lang="en-US"/>
           </a:p>
@@ -2922,7 +2922,7 @@
           <a:p>
             <a:fld id="{BBD4DFF7-324E-F644-A6D8-3EAC27DBE432}" type="datetimeFigureOut">
               <a:rPr lang="en-US" smtClean="0"/>
-              <a:t>11/12/21</a:t>
+              <a:t>11/15/21</a:t>
             </a:fld>
             <a:endParaRPr lang="en-US"/>
           </a:p>
@@ -3737,7 +3737,24 @@
                 <a:latin typeface="Helvetica" pitchFamily="2" charset="0"/>
                 <a:cs typeface="Arial" panose="020B0604020202020204" pitchFamily="34" charset="0"/>
               </a:rPr>
-              <a:t>Pd Catalysts Telomerization</a:t>
+              <a:t>Pd-catalyzed </a:t>
+            </a:r>
+          </a:p>
+          <a:p>
+            <a:pPr algn="ctr"/>
+            <a:r>
+              <a:rPr lang="en-US" sz="2400" dirty="0">
+                <a:latin typeface="Symbol" pitchFamily="2" charset="2"/>
+                <a:cs typeface="Arial" panose="020B0604020202020204" pitchFamily="34" charset="0"/>
+              </a:rPr>
+              <a:t>d</a:t>
+            </a:r>
+            <a:r>
+              <a:rPr lang="en-US" sz="2400" dirty="0">
+                <a:latin typeface="Helvetica" pitchFamily="2" charset="0"/>
+                <a:cs typeface="Arial" panose="020B0604020202020204" pitchFamily="34" charset="0"/>
+              </a:rPr>
+              <a:t>-lactones</a:t>
             </a:r>
           </a:p>
         </p:txBody>
@@ -3924,6 +3941,139 @@
           <a:xfrm>
             <a:off x="-1764392" y="1023972"/>
             <a:ext cx="2938927" cy="2926080"/>
+          </a:xfrm>
+          <a:prstGeom prst="rect">
+            <a:avLst/>
+          </a:prstGeom>
+        </p:spPr>
+      </p:pic>
+      <p:grpSp>
+        <p:nvGrpSpPr>
+          <p:cNvPr id="11" name="Group 10">
+            <a:extLst>
+              <a:ext uri="{FF2B5EF4-FFF2-40B4-BE49-F238E27FC236}">
+                <a16:creationId xmlns:a16="http://schemas.microsoft.com/office/drawing/2014/main" id="{5218715A-CE8C-A04E-AE36-B87742C906FD}"/>
+              </a:ext>
+            </a:extLst>
+          </p:cNvPr>
+          <p:cNvGrpSpPr>
+            <a:grpSpLocks noChangeAspect="1"/>
+          </p:cNvGrpSpPr>
+          <p:nvPr/>
+        </p:nvGrpSpPr>
+        <p:grpSpPr>
+          <a:xfrm>
+            <a:off x="6042877" y="1023972"/>
+            <a:ext cx="2374059" cy="2926080"/>
+            <a:chOff x="6393879" y="1852629"/>
+            <a:chExt cx="1427404" cy="1759307"/>
+          </a:xfrm>
+        </p:grpSpPr>
+        <p:pic>
+          <p:nvPicPr>
+            <p:cNvPr id="10" name="Picture 9" descr="A screenshot of a computer&#10;&#10;Description automatically generated with low confidence">
+              <a:extLst>
+                <a:ext uri="{FF2B5EF4-FFF2-40B4-BE49-F238E27FC236}">
+                  <a16:creationId xmlns:a16="http://schemas.microsoft.com/office/drawing/2014/main" id="{23A7716A-CB78-F341-B7C6-39B1A4F7FCB7}"/>
+                </a:ext>
+              </a:extLst>
+            </p:cNvPr>
+            <p:cNvPicPr>
+              <a:picLocks noChangeAspect="1"/>
+            </p:cNvPicPr>
+            <p:nvPr/>
+          </p:nvPicPr>
+          <p:blipFill rotWithShape="1">
+            <a:blip r:embed="rId4"/>
+            <a:srcRect t="12219" r="82814" b="54401"/>
+            <a:stretch/>
+          </p:blipFill>
+          <p:spPr>
+            <a:xfrm>
+              <a:off x="6393879" y="1852629"/>
+              <a:ext cx="1230994" cy="1759307"/>
+            </a:xfrm>
+            <a:prstGeom prst="rect">
+              <a:avLst/>
+            </a:prstGeom>
+          </p:spPr>
+        </p:pic>
+        <p:sp>
+          <p:nvSpPr>
+            <p:cNvPr id="13" name="Rectangle 12">
+              <a:extLst>
+                <a:ext uri="{FF2B5EF4-FFF2-40B4-BE49-F238E27FC236}">
+                  <a16:creationId xmlns:a16="http://schemas.microsoft.com/office/drawing/2014/main" id="{5D3B1208-D441-DA40-8AFA-306721A93E31}"/>
+                </a:ext>
+              </a:extLst>
+            </p:cNvPr>
+            <p:cNvSpPr/>
+            <p:nvPr/>
+          </p:nvSpPr>
+          <p:spPr>
+            <a:xfrm>
+              <a:off x="7533952" y="2608755"/>
+              <a:ext cx="287331" cy="498763"/>
+            </a:xfrm>
+            <a:prstGeom prst="rect">
+              <a:avLst/>
+            </a:prstGeom>
+            <a:solidFill>
+              <a:schemeClr val="bg1"/>
+            </a:solidFill>
+            <a:ln>
+              <a:noFill/>
+            </a:ln>
+          </p:spPr>
+          <p:style>
+            <a:lnRef idx="2">
+              <a:schemeClr val="accent1">
+                <a:shade val="50000"/>
+              </a:schemeClr>
+            </a:lnRef>
+            <a:fillRef idx="1">
+              <a:schemeClr val="accent1"/>
+            </a:fillRef>
+            <a:effectRef idx="0">
+              <a:schemeClr val="accent1"/>
+            </a:effectRef>
+            <a:fontRef idx="minor">
+              <a:schemeClr val="lt1"/>
+            </a:fontRef>
+          </p:style>
+          <p:txBody>
+            <a:bodyPr rtlCol="0" anchor="ctr"/>
+            <a:lstStyle/>
+            <a:p>
+              <a:pPr algn="ctr"/>
+              <a:endParaRPr lang="en-US"/>
+            </a:p>
+          </p:txBody>
+        </p:sp>
+      </p:grpSp>
+      <p:pic>
+        <p:nvPicPr>
+          <p:cNvPr id="8" name="Picture 7" descr="Diagram&#10;&#10;Description automatically generated">
+            <a:extLst>
+              <a:ext uri="{FF2B5EF4-FFF2-40B4-BE49-F238E27FC236}">
+                <a16:creationId xmlns:a16="http://schemas.microsoft.com/office/drawing/2014/main" id="{1118C256-D79E-EC49-A83B-95BA475F5E23}"/>
+              </a:ext>
+            </a:extLst>
+          </p:cNvPr>
+          <p:cNvPicPr>
+            <a:picLocks noChangeAspect="1"/>
+          </p:cNvPicPr>
+          <p:nvPr/>
+        </p:nvPicPr>
+        <p:blipFill rotWithShape="1">
+          <a:blip r:embed="rId5"/>
+          <a:srcRect b="22185"/>
+          <a:stretch/>
+        </p:blipFill>
+        <p:spPr>
+          <a:xfrm>
+            <a:off x="1525753" y="1023972"/>
+            <a:ext cx="3527374" cy="2926080"/>
           </a:xfrm>
           <a:prstGeom prst="rect">
             <a:avLst/>
@@ -4667,6 +4817,21 @@
 </file>
 
 <file path=customXml/item1.xml><?xml version="1.0" encoding="utf-8"?>
+<p:properties xmlns:p="http://schemas.microsoft.com/office/2006/metadata/properties" xmlns:xsi="http://www.w3.org/2001/XMLSchema-instance" xmlns:pc="http://schemas.microsoft.com/office/infopath/2007/PartnerControls">
+  <documentManagement/>
+</p:properties>
+</file>
+
+<file path=customXml/item2.xml><?xml version="1.0" encoding="utf-8"?>
+<?mso-contentType ?>
+<FormTemplates xmlns="http://schemas.microsoft.com/sharepoint/v3/contenttype/forms">
+  <Display>DocumentLibraryForm</Display>
+  <Edit>DocumentLibraryForm</Edit>
+  <New>DocumentLibraryForm</New>
+</FormTemplates>
+</file>
+
+<file path=customXml/item3.xml><?xml version="1.0" encoding="utf-8"?>
 <ct:contentTypeSchema xmlns:ct="http://schemas.microsoft.com/office/2006/metadata/contentType" xmlns:ma="http://schemas.microsoft.com/office/2006/metadata/properties/metaAttributes" ct:_="" ma:_="" ma:contentTypeName="Document" ma:contentTypeID="0x0101001F602C145340244280FF1845B0CC6B21" ma:contentTypeVersion="10" ma:contentTypeDescription="Create a new document." ma:contentTypeScope="" ma:versionID="494a61f927e0d5ed0c22cb6b5069076c">
   <xsd:schema xmlns:xsd="http://www.w3.org/2001/XMLSchema" xmlns:xs="http://www.w3.org/2001/XMLSchema" xmlns:p="http://schemas.microsoft.com/office/2006/metadata/properties" xmlns:ns2="b84d7a67-fd90-45b0-918a-e526e21306de" xmlns:ns3="c71619e3-b0a1-4cee-b9a7-c8f7eda74159" targetNamespace="http://schemas.microsoft.com/office/2006/metadata/properties" ma:root="true" ma:fieldsID="85573b529b6a107192dd7166f746ad15" ns2:_="" ns3:_="">
     <xsd:import namespace="b84d7a67-fd90-45b0-918a-e526e21306de"/>
@@ -4871,22 +5036,32 @@
 </ct:contentTypeSchema>
 </file>
 
-<file path=customXml/item2.xml><?xml version="1.0" encoding="utf-8"?>
-<p:properties xmlns:p="http://schemas.microsoft.com/office/2006/metadata/properties" xmlns:xsi="http://www.w3.org/2001/XMLSchema-instance" xmlns:pc="http://schemas.microsoft.com/office/infopath/2007/PartnerControls">
-  <documentManagement/>
-</p:properties>
+<file path=customXml/itemProps1.xml><?xml version="1.0" encoding="utf-8"?>
+<ds:datastoreItem xmlns:ds="http://schemas.openxmlformats.org/officeDocument/2006/customXml" ds:itemID="{86F18A1F-EFD6-4273-B64A-9926F24AB9A0}">
+  <ds:schemaRefs>
+    <ds:schemaRef ds:uri="http://schemas.microsoft.com/office/2006/metadata/properties"/>
+    <ds:schemaRef ds:uri="b84d7a67-fd90-45b0-918a-e526e21306de"/>
+    <ds:schemaRef ds:uri="http://www.w3.org/XML/1998/namespace"/>
+    <ds:schemaRef ds:uri="http://schemas.microsoft.com/office/2006/documentManagement/types"/>
+    <ds:schemaRef ds:uri="http://schemas.openxmlformats.org/package/2006/metadata/core-properties"/>
+    <ds:schemaRef ds:uri="http://purl.org/dc/terms/"/>
+    <ds:schemaRef ds:uri="http://purl.org/dc/elements/1.1/"/>
+    <ds:schemaRef ds:uri="c71619e3-b0a1-4cee-b9a7-c8f7eda74159"/>
+    <ds:schemaRef ds:uri="http://schemas.microsoft.com/office/infopath/2007/PartnerControls"/>
+    <ds:schemaRef ds:uri="http://purl.org/dc/dcmitype/"/>
+  </ds:schemaRefs>
+</ds:datastoreItem>
 </file>
 
-<file path=customXml/item3.xml><?xml version="1.0" encoding="utf-8"?>
-<?mso-contentType ?>
-<FormTemplates xmlns="http://schemas.microsoft.com/sharepoint/v3/contenttype/forms">
-  <Display>DocumentLibraryForm</Display>
-  <Edit>DocumentLibraryForm</Edit>
-  <New>DocumentLibraryForm</New>
-</FormTemplates>
+<file path=customXml/itemProps2.xml><?xml version="1.0" encoding="utf-8"?>
+<ds:datastoreItem xmlns:ds="http://schemas.openxmlformats.org/officeDocument/2006/customXml" ds:itemID="{611FFAF3-FB57-4FAE-BFA5-AA6CE01934BD}">
+  <ds:schemaRefs>
+    <ds:schemaRef ds:uri="http://schemas.microsoft.com/sharepoint/v3/contenttype/forms"/>
+  </ds:schemaRefs>
+</ds:datastoreItem>
 </file>
 
-<file path=customXml/itemProps1.xml><?xml version="1.0" encoding="utf-8"?>
+<file path=customXml/itemProps3.xml><?xml version="1.0" encoding="utf-8"?>
 <ds:datastoreItem xmlns:ds="http://schemas.openxmlformats.org/officeDocument/2006/customXml" ds:itemID="{BA34409C-6B1F-49A1-91D8-CDFC833F22CF}">
   <ds:schemaRefs>
     <ds:schemaRef ds:uri="http://schemas.microsoft.com/office/2006/metadata/contentType"/>
@@ -4903,29 +5078,4 @@
     <ds:schemaRef ds:uri="http://schemas.microsoft.com/internal/obd"/>
   </ds:schemaRefs>
 </ds:datastoreItem>
-</file>
-
-<file path=customXml/itemProps2.xml><?xml version="1.0" encoding="utf-8"?>
-<ds:datastoreItem xmlns:ds="http://schemas.openxmlformats.org/officeDocument/2006/customXml" ds:itemID="{86F18A1F-EFD6-4273-B64A-9926F24AB9A0}">
-  <ds:schemaRefs>
-    <ds:schemaRef ds:uri="http://schemas.microsoft.com/office/2006/metadata/properties"/>
-    <ds:schemaRef ds:uri="b84d7a67-fd90-45b0-918a-e526e21306de"/>
-    <ds:schemaRef ds:uri="http://www.w3.org/XML/1998/namespace"/>
-    <ds:schemaRef ds:uri="http://schemas.microsoft.com/office/2006/documentManagement/types"/>
-    <ds:schemaRef ds:uri="http://schemas.openxmlformats.org/package/2006/metadata/core-properties"/>
-    <ds:schemaRef ds:uri="http://purl.org/dc/terms/"/>
-    <ds:schemaRef ds:uri="http://purl.org/dc/elements/1.1/"/>
-    <ds:schemaRef ds:uri="c71619e3-b0a1-4cee-b9a7-c8f7eda74159"/>
-    <ds:schemaRef ds:uri="http://schemas.microsoft.com/office/infopath/2007/PartnerControls"/>
-    <ds:schemaRef ds:uri="http://purl.org/dc/dcmitype/"/>
-  </ds:schemaRefs>
-</ds:datastoreItem>
-</file>
-
-<file path=customXml/itemProps3.xml><?xml version="1.0" encoding="utf-8"?>
-<ds:datastoreItem xmlns:ds="http://schemas.openxmlformats.org/officeDocument/2006/customXml" ds:itemID="{611FFAF3-FB57-4FAE-BFA5-AA6CE01934BD}">
-  <ds:schemaRefs>
-    <ds:schemaRef ds:uri="http://schemas.microsoft.com/sharepoint/v3/contenttype/forms"/>
-  </ds:schemaRefs>
-</ds:datastoreItem>
 </file>
</xml_diff>